<commit_message>
Added attribution to ipynb
</commit_message>
<xml_diff>
--- a/1 - introduction/DLMR 1 - introduction.pptx
+++ b/1 - introduction/DLMR 1 - introduction.pptx
@@ -4381,7 +4381,7 @@
         </p:nvSpPr>
         <p:spPr>
           <a:xfrm>
-            <a:off x="4497755" y="4898056"/>
+            <a:off x="4344442" y="4887106"/>
             <a:ext cx="6831673" cy="1086237"/>
           </a:xfrm>
         </p:spPr>
@@ -4391,7 +4391,7 @@
           <a:p>
             <a:r>
               <a:rPr lang="en-US" dirty="0"/>
-              <a:t>Prof. </a:t>
+              <a:t>Sam Green and Prof. </a:t>
             </a:r>
             <a:r>
               <a:rPr lang="en-US" dirty="0" err="1"/>
@@ -4405,10 +4405,7 @@
               <a:rPr lang="en-US" dirty="0" err="1"/>
               <a:t>Koç</a:t>
             </a:r>
-            <a:r>
-              <a:rPr lang="en-US" dirty="0"/>
-              <a:t> &amp; Sam Green</a:t>
-            </a:r>
+            <a:endParaRPr lang="en-US" dirty="0"/>
           </a:p>
         </p:txBody>
       </p:sp>
@@ -5587,35 +5584,15 @@
           <a:lstStyle/>
           <a:p>
             <a:r>
-              <a:rPr lang="en-US" dirty="0"/>
-              <a:t>Download files from </a:t>
-            </a:r>
-            <a:r>
               <a:rPr lang="en-US" dirty="0">
                 <a:hlinkClick r:id="rId2"/>
               </a:rPr>
-              <a:t>https://gitlab.erc.monash.edu.au/andrease/Python4Maths/tree/master/Intro-to-Python</a:t>
+              <a:t>https://colab.research.google.com/github/sg2/intro/blob/master/1%20-%20introduction/Python%20Introduction%201.ipynb</a:t>
             </a:r>
             <a:endParaRPr lang="en-US" dirty="0"/>
           </a:p>
           <a:p>
-            <a:r>
-              <a:rPr lang="en-US" dirty="0"/>
-              <a:t>Go to </a:t>
-            </a:r>
-            <a:r>
-              <a:rPr lang="en-US" dirty="0">
-                <a:hlinkClick r:id="rId3"/>
-              </a:rPr>
-              <a:t>http://colab.research.google.com</a:t>
-            </a:r>
             <a:endParaRPr lang="en-US" dirty="0"/>
-          </a:p>
-          <a:p>
-            <a:r>
-              <a:rPr lang="en-US" dirty="0"/>
-              <a:t>From the downloaded files, upload 01.ipynb</a:t>
-            </a:r>
           </a:p>
         </p:txBody>
       </p:sp>
@@ -6069,9 +6046,15 @@
           <a:lstStyle/>
           <a:p>
             <a:r>
-              <a:rPr lang="en-US" dirty="0"/>
-              <a:t>Upload PyTorch-CIFAR-10.ipynb</a:t>
-            </a:r>
+              <a:rPr lang="en-US" dirty="0">
+                <a:hlinkClick r:id="rId2"/>
+              </a:rPr>
+              <a:t>https://colab.research.google.com/github/sg2/intro/blob/master/1%20-%20introduction/PyTorch_CIFAR_10.ipynb</a:t>
+            </a:r>
+            <a:endParaRPr lang="en-US" dirty="0"/>
+          </a:p>
+          <a:p>
+            <a:endParaRPr lang="en-US" dirty="0"/>
           </a:p>
         </p:txBody>
       </p:sp>

</xml_diff>